<commit_message>
aws session 2 res
</commit_message>
<xml_diff>
--- a/Introduction to Cloud Computing and AWS.pptx
+++ b/Introduction to Cloud Computing and AWS.pptx
@@ -58,6 +58,7 @@
     <p:sldId id="291" r:id="rId52"/>
     <p:sldId id="292" r:id="rId53"/>
     <p:sldId id="293" r:id="rId54"/>
+    <p:sldId id="310" r:id="rId55"/>
   </p:sldIdLst>
   <p:sldSz cx="12192000" cy="6858000"/>
   <p:notesSz cx="6858000" cy="9144000"/>
@@ -226,6 +227,7 @@
             <p14:sldId id="291"/>
             <p14:sldId id="292"/>
             <p14:sldId id="293"/>
+            <p14:sldId id="310"/>
           </p14:sldIdLst>
         </p14:section>
       </p14:sectionLst>
@@ -11696,7 +11698,7 @@
                     <a:p>
                       <a:pPr algn="ctr"/>
                       <a:r>
-                        <a:rPr lang="en-IN"/>
+                        <a:rPr lang="en-IN" dirty="0"/>
                         <a:t>S3 Standard</a:t>
                       </a:r>
                     </a:p>
@@ -11747,7 +11749,7 @@
                     <a:p>
                       <a:pPr algn="ctr"/>
                       <a:r>
-                        <a:rPr lang="en-IN"/>
+                        <a:rPr lang="en-IN" dirty="0"/>
                         <a:t>Frequent access</a:t>
                       </a:r>
                     </a:p>
@@ -11958,7 +11960,7 @@
                     <a:p>
                       <a:pPr algn="ctr"/>
                       <a:r>
-                        <a:rPr lang="en-IN"/>
+                        <a:rPr lang="en-IN" dirty="0"/>
                         <a:t>S3 Intelligent-Tiering</a:t>
                       </a:r>
                     </a:p>
@@ -12009,7 +12011,7 @@
                     <a:p>
                       <a:pPr algn="ctr"/>
                       <a:r>
-                        <a:rPr lang="en-IN"/>
+                        <a:rPr lang="en-IN" dirty="0"/>
                         <a:t>Dynamic access patterns</a:t>
                       </a:r>
                     </a:p>
@@ -12220,7 +12222,7 @@
                     <a:p>
                       <a:pPr algn="ctr"/>
                       <a:r>
-                        <a:rPr lang="en-IN"/>
+                        <a:rPr lang="en-IN" dirty="0"/>
                         <a:t>S3 Standard-IA</a:t>
                       </a:r>
                     </a:p>
@@ -12271,7 +12273,7 @@
                     <a:p>
                       <a:pPr algn="ctr"/>
                       <a:r>
-                        <a:rPr lang="en-IN"/>
+                        <a:rPr lang="en-IN" dirty="0"/>
                         <a:t>Infrequent access</a:t>
                       </a:r>
                     </a:p>
@@ -12482,7 +12484,7 @@
                     <a:p>
                       <a:pPr algn="ctr"/>
                       <a:r>
-                        <a:rPr lang="en-IN"/>
+                        <a:rPr lang="en-IN" dirty="0"/>
                         <a:t>S3 Glacier</a:t>
                       </a:r>
                     </a:p>
@@ -12533,7 +12535,7 @@
                     <a:p>
                       <a:pPr algn="ctr"/>
                       <a:r>
-                        <a:rPr lang="en-US"/>
+                        <a:rPr lang="en-US" dirty="0"/>
                         <a:t>Archival, minutes to hours access</a:t>
                       </a:r>
                     </a:p>
@@ -12744,7 +12746,7 @@
                     <a:p>
                       <a:pPr algn="ctr"/>
                       <a:r>
-                        <a:rPr lang="en-IN"/>
+                        <a:rPr lang="en-IN" dirty="0"/>
                         <a:t>S3 Glacier Deep Archive</a:t>
                       </a:r>
                     </a:p>
@@ -12795,7 +12797,7 @@
                     <a:p>
                       <a:pPr algn="ctr"/>
                       <a:r>
-                        <a:rPr lang="en-IN"/>
+                        <a:rPr lang="en-IN" dirty="0"/>
                         <a:t>Long-term archive</a:t>
                       </a:r>
                     </a:p>
@@ -13826,6 +13828,70 @@
     <p:extLst>
       <p:ext uri="{BB962C8B-B14F-4D97-AF65-F5344CB8AC3E}">
         <p14:creationId xmlns:p14="http://schemas.microsoft.com/office/powerpoint/2010/main" val="156789141"/>
+      </p:ext>
+    </p:extLst>
+  </p:cSld>
+  <p:clrMapOvr>
+    <a:masterClrMapping/>
+  </p:clrMapOvr>
+</p:sld>
+</file>
+
+<file path=ppt/slides/slide54.xml><?xml version="1.0" encoding="utf-8"?>
+<p:sld xmlns:a="http://schemas.openxmlformats.org/drawingml/2006/main" xmlns:r="http://schemas.openxmlformats.org/officeDocument/2006/relationships" xmlns:p="http://schemas.openxmlformats.org/presentationml/2006/main">
+  <p:cSld>
+    <p:spTree>
+      <p:nvGrpSpPr>
+        <p:cNvPr id="1" name=""/>
+        <p:cNvGrpSpPr/>
+        <p:nvPr/>
+      </p:nvGrpSpPr>
+      <p:grpSpPr>
+        <a:xfrm>
+          <a:off x="0" y="0"/>
+          <a:ext cx="0" cy="0"/>
+          <a:chOff x="0" y="0"/>
+          <a:chExt cx="0" cy="0"/>
+        </a:xfrm>
+      </p:grpSpPr>
+      <p:sp>
+        <p:nvSpPr>
+          <p:cNvPr id="2" name="Title 1">
+            <a:extLst>
+              <a:ext uri="{FF2B5EF4-FFF2-40B4-BE49-F238E27FC236}">
+                <a16:creationId xmlns:a16="http://schemas.microsoft.com/office/drawing/2014/main" id="{AC829338-2E4D-3482-7862-CBF2CCC38125}"/>
+              </a:ext>
+            </a:extLst>
+          </p:cNvPr>
+          <p:cNvSpPr>
+            <a:spLocks noGrp="1"/>
+          </p:cNvSpPr>
+          <p:nvPr>
+            <p:ph type="title"/>
+          </p:nvPr>
+        </p:nvSpPr>
+        <p:spPr>
+          <a:xfrm>
+            <a:off x="2231136" y="2834640"/>
+            <a:ext cx="7729728" cy="1188720"/>
+          </a:xfrm>
+        </p:spPr>
+        <p:txBody>
+          <a:bodyPr/>
+          <a:lstStyle/>
+          <a:p>
+            <a:r>
+              <a:rPr lang="en-US" dirty="0"/>
+              <a:t>Thank you</a:t>
+            </a:r>
+            <a:endParaRPr lang="en-IN" dirty="0"/>
+          </a:p>
+        </p:txBody>
+      </p:sp>
+    </p:spTree>
+    <p:extLst>
+      <p:ext uri="{BB962C8B-B14F-4D97-AF65-F5344CB8AC3E}">
+        <p14:creationId xmlns:p14="http://schemas.microsoft.com/office/powerpoint/2010/main" val="4034105344"/>
       </p:ext>
     </p:extLst>
   </p:cSld>

</xml_diff>